<commit_message>
Updates slides and common scenarios image.
</commit_message>
<xml_diff>
--- a/Whiteboard design session/WDS trainer presentation - Data platform upgrade and migration.pptx
+++ b/Whiteboard design session/WDS trainer presentation - Data platform upgrade and migration.pptx
@@ -226,7 +226,7 @@
           <a:p>
             <a:fld id="{52A13B17-C506-4D51-BB37-16B365906619}" type="datetimeFigureOut">
               <a:rPr lang="en-US" smtClean="0"/>
-              <a:t>5/16/2018</a:t>
+              <a:t>6/21/2018</a:t>
             </a:fld>
             <a:endParaRPr lang="en-US" dirty="0"/>
           </a:p>
@@ -2779,7 +2779,7 @@
             </a:pPr>
             <a:r>
               <a:rPr lang="en-US" sz="1200" b="1" i="1" dirty="0"/>
-              <a:t>What components do we need to use to upgrade the SQL Server Data warehouse to SQL Server 2017 Enterprise?</a:t>
+              <a:t>What components do we need to use to upgrade the SQL Server Data warehouse to Azure SQL Database?</a:t>
             </a:r>
           </a:p>
           <a:p>
@@ -2888,7 +2888,7 @@
             </a:pPr>
             <a:r>
               <a:rPr lang="en-US" sz="1200" b="1" i="1" dirty="0"/>
-              <a:t>Identify the major milestones of delivery an upgraded SQL Server 2017 Enterprise upgrade.</a:t>
+              <a:t>Identify the major milestones of delivery an upgrading to Azure SQL Database.</a:t>
             </a:r>
           </a:p>
           <a:p>
@@ -3203,6 +3203,29 @@
               <a:defRPr/>
             </a:pPr>
             <a:endParaRPr lang="en-US" sz="1200" b="0" i="0" dirty="0"/>
+          </a:p>
+          <a:p>
+            <a:pPr marL="171450" marR="0" lvl="0" indent="-171450" algn="l" defTabSz="914400" rtl="0" eaLnBrk="1" fontAlgn="auto" latinLnBrk="0" hangingPunct="1">
+              <a:lnSpc>
+                <a:spcPct val="100000"/>
+              </a:lnSpc>
+              <a:spcBef>
+                <a:spcPts val="0"/>
+              </a:spcBef>
+              <a:spcAft>
+                <a:spcPts val="0"/>
+              </a:spcAft>
+              <a:buClrTx/>
+              <a:buSzTx/>
+              <a:buFont typeface="Arial" panose="020B0604020202020204" pitchFamily="34" charset="0"/>
+              <a:buChar char="•"/>
+              <a:tabLst/>
+              <a:defRPr/>
+            </a:pPr>
+            <a:r>
+              <a:rPr lang="en-US" sz="1200" b="0" i="0" dirty="0"/>
+              <a:t>Azure Database Migration Service</a:t>
+            </a:r>
           </a:p>
           <a:p>
             <a:pPr marL="171450" marR="0" lvl="0" indent="-171450" algn="l" defTabSz="914400" rtl="0" eaLnBrk="1" fontAlgn="auto" latinLnBrk="0" hangingPunct="1">
@@ -5952,7 +5975,7 @@
                   <a:prstClr val="black"/>
                 </a:solidFill>
               </a:rPr>
-              <a:t>5/16/2018 12:19 PM</a:t>
+              <a:t>6/21/2018 10:53 AM</a:t>
             </a:fld>
             <a:endParaRPr lang="en-US" dirty="0">
               <a:solidFill>
@@ -21343,10 +21366,10 @@
       </p:sp>
       <p:pic>
         <p:nvPicPr>
-          <p:cNvPr id="3" name="Picture 2" descr="This solution diagram is divided in to Microsoft Azure, and On Premises. Microsoft Azure includes SQL Server 2017 in a VM as an Always On Secondary, and Azure SQL Data Warehouse for a stretch table. On Premise includes the following elements: API App for vendor connections; Web App for Internet Sales Transactions; ASP.NET Core App for inventory management; SQL Server 2017 OLTP for Always On and JSON store; SSRS 2017 for Reporting of OLTP, Data Warehouse, and Cubes; SSIS 2017 for a Data Warehouse Load; Excel for reporting; SQL Server 2017 Enterprise for a Data Warehouse; and SSAS 2017 for a Data Warehouse. " title="Preferred solution diagram">
+          <p:cNvPr id="4" name="Picture 3" descr="This solution diagram is divided in to Microsoft Azure, and On Premises. Microsoft Azure includes SQL Server 2017 in a VM as an Always On Secondary, and Azure SQL Data Warehouse for a stretch table. On Premise includes the following elements: API App for vendor connections; Web App for Internet Sales Transactions; ASP.NET Core App for inventory management; SQL Server 2017 OLTP for Always On and JSON store; SSRS 2017 for Reporting of OLTP, Data Warehouse, and Cubes; SSIS 2017 for a Data Warehouse Load; Excel for reporting; SQL Server 2017 Enterprise for a Data Warehouse; and SSAS 2017 for a Data Warehouse. " title="Preferred solution diagram">
             <a:extLst>
               <a:ext uri="{FF2B5EF4-FFF2-40B4-BE49-F238E27FC236}">
-                <a16:creationId xmlns:a16="http://schemas.microsoft.com/office/drawing/2014/main" id="{297CE14B-CA24-46F7-8C5F-9866DD626926}"/>
+                <a16:creationId xmlns:a16="http://schemas.microsoft.com/office/drawing/2014/main" id="{AA575635-8D6F-4258-BD7A-0E428B2D346D}"/>
               </a:ext>
             </a:extLst>
           </p:cNvPr>
@@ -21363,8 +21386,8 @@
         </p:blipFill>
         <p:spPr>
           <a:xfrm>
-            <a:off x="1574127" y="1053867"/>
-            <a:ext cx="9043745" cy="5691181"/>
+            <a:off x="1372882" y="1189176"/>
+            <a:ext cx="9446236" cy="5511030"/>
           </a:xfrm>
           <a:prstGeom prst="rect">
             <a:avLst/>
@@ -22486,7 +22509,7 @@
         </p:spPr>
         <p:txBody>
           <a:bodyPr wrap="square" lIns="182880" tIns="146304" rIns="182880" bIns="146304" rtlCol="0">
-            <a:normAutofit fontScale="92500" lnSpcReduction="20000"/>
+            <a:normAutofit/>
           </a:bodyPr>
           <a:lstStyle/>
           <a:p>
@@ -22519,7 +22542,7 @@
                 <a:latin typeface="Segoe UI Semilight" panose="020B0402040204020203" pitchFamily="34" charset="0"/>
                 <a:cs typeface="Segoe UI Semilight" panose="020B0402040204020203" pitchFamily="34" charset="0"/>
               </a:rPr>
-              <a:t>This hands-on lab is designed to help attendees better understand how to build a Proof-of-Concept (POC) and conduct a site analysis for a customer to compare cost, performance, and level of effort required to migrate from Oracle to SQL Server. You will evaluate the dependent applications and reports that will need to be updated, and come up with a migration plan. In addition, attendees will help the customer take advantage of new SQL Server features to improve performance and resiliency, as well as explore ways to migrate from an old version of SQL Server to the newest version and consider the impact of migrating from on-premises to the cloud.</a:t>
+              <a:t>In this whiteboard design session, you will design a proof of concept (POC) for conducting a site analysis for a customer to compare cost, performance, and level of effort required to migrate from Oracle to SQL Server. You will evaluate the dependent applications and reports that will need to be updated, and come up with a migration plan. In addition, you will look at ways to help the customer take advantage of new SQL Server features to improve performance and resiliency, as well as explore ways to migrate from an old version of SQL Server to the latest version and consider the impact of migrating from on-premises to the cloud.</a:t>
             </a:r>
           </a:p>
           <a:p>
@@ -22531,7 +22554,10 @@
                 <a:spcPts val="600"/>
               </a:spcAft>
             </a:pPr>
-            <a:endParaRPr lang="en-US" sz="2400" dirty="0"/>
+            <a:endParaRPr lang="en-US" sz="2400" dirty="0">
+              <a:latin typeface="Segoe UI Semilight" panose="020B0402040204020203" pitchFamily="34" charset="0"/>
+              <a:cs typeface="Segoe UI Semilight" panose="020B0402040204020203" pitchFamily="34" charset="0"/>
+            </a:endParaRPr>
           </a:p>
           <a:p>
             <a:pPr>
@@ -22543,124 +22569,11 @@
               </a:spcAft>
             </a:pPr>
             <a:r>
-              <a:rPr lang="en-US" sz="3600" dirty="0">
-                <a:latin typeface="+mj-lt"/>
-              </a:rPr>
-              <a:t>Learning objectives</a:t>
-            </a:r>
-          </a:p>
-          <a:p>
-            <a:pPr marL="342900" indent="-342900">
-              <a:lnSpc>
-                <a:spcPct val="90000"/>
-              </a:lnSpc>
-              <a:spcAft>
-                <a:spcPts val="600"/>
-              </a:spcAft>
-              <a:buFont typeface="Arial" panose="020B0604020202020204" pitchFamily="34" charset="0"/>
-              <a:buChar char="•"/>
-            </a:pPr>
-            <a:r>
               <a:rPr lang="en-US" sz="2400" dirty="0">
                 <a:latin typeface="Segoe UI Semilight" panose="020B0402040204020203" pitchFamily="34" charset="0"/>
                 <a:cs typeface="Segoe UI Semilight" panose="020B0402040204020203" pitchFamily="34" charset="0"/>
               </a:rPr>
-              <a:t>Migrate from Oracle to SQL Server using SQL Server Migration Assistant</a:t>
-            </a:r>
-          </a:p>
-          <a:p>
-            <a:pPr marL="342900" indent="-342900">
-              <a:lnSpc>
-                <a:spcPct val="90000"/>
-              </a:lnSpc>
-              <a:spcAft>
-                <a:spcPts val="600"/>
-              </a:spcAft>
-              <a:buFont typeface="Arial" panose="020B0604020202020204" pitchFamily="34" charset="0"/>
-              <a:buChar char="•"/>
-            </a:pPr>
-            <a:r>
-              <a:rPr lang="en-US" sz="2400" dirty="0">
-                <a:latin typeface="Segoe UI Semilight" panose="020B0402040204020203" pitchFamily="34" charset="0"/>
-                <a:cs typeface="Segoe UI Semilight" panose="020B0402040204020203" pitchFamily="34" charset="0"/>
-              </a:rPr>
-              <a:t>Migration between different SQL Server editions using Data Migration Assistant</a:t>
-            </a:r>
-          </a:p>
-          <a:p>
-            <a:pPr marL="342900" indent="-342900">
-              <a:lnSpc>
-                <a:spcPct val="90000"/>
-              </a:lnSpc>
-              <a:spcAft>
-                <a:spcPts val="600"/>
-              </a:spcAft>
-              <a:buFont typeface="Arial" panose="020B0604020202020204" pitchFamily="34" charset="0"/>
-              <a:buChar char="•"/>
-            </a:pPr>
-            <a:r>
-              <a:rPr lang="en-US" sz="2400" dirty="0">
-                <a:latin typeface="Segoe UI Semilight" panose="020B0402040204020203" pitchFamily="34" charset="0"/>
-                <a:cs typeface="Segoe UI Semilight" panose="020B0402040204020203" pitchFamily="34" charset="0"/>
-              </a:rPr>
-              <a:t>Use advanced SQL Server features, such as JavaScript Object Notation (JSON) data store, table compression, Transparent Data Encryption, and clustered ColumnStore indexing</a:t>
-            </a:r>
-          </a:p>
-          <a:p>
-            <a:pPr marL="342900" indent="-342900">
-              <a:lnSpc>
-                <a:spcPct val="90000"/>
-              </a:lnSpc>
-              <a:spcAft>
-                <a:spcPts val="600"/>
-              </a:spcAft>
-              <a:buFont typeface="Arial" panose="020B0604020202020204" pitchFamily="34" charset="0"/>
-              <a:buChar char="•"/>
-            </a:pPr>
-            <a:r>
-              <a:rPr lang="en-US" sz="2400" dirty="0">
-                <a:latin typeface="Segoe UI Semilight" panose="020B0402040204020203" pitchFamily="34" charset="0"/>
-                <a:cs typeface="Segoe UI Semilight" panose="020B0402040204020203" pitchFamily="34" charset="0"/>
-              </a:rPr>
-              <a:t>Consider steps required to update existing apps to use new platform</a:t>
-            </a:r>
-          </a:p>
-          <a:p>
-            <a:pPr marL="342900" indent="-342900">
-              <a:lnSpc>
-                <a:spcPct val="90000"/>
-              </a:lnSpc>
-              <a:spcAft>
-                <a:spcPts val="600"/>
-              </a:spcAft>
-              <a:buFont typeface="Arial" panose="020B0604020202020204" pitchFamily="34" charset="0"/>
-              <a:buChar char="•"/>
-            </a:pPr>
-            <a:r>
-              <a:rPr lang="en-US" sz="2400" dirty="0">
-                <a:latin typeface="Segoe UI Semilight" panose="020B0402040204020203" pitchFamily="34" charset="0"/>
-                <a:cs typeface="Segoe UI Semilight" panose="020B0402040204020203" pitchFamily="34" charset="0"/>
-              </a:rPr>
-              <a:t>Analyze and improve database performance</a:t>
-            </a:r>
-          </a:p>
-          <a:p>
-            <a:pPr marL="342900" indent="-342900">
-              <a:lnSpc>
-                <a:spcPct val="90000"/>
-              </a:lnSpc>
-              <a:spcAft>
-                <a:spcPts val="600"/>
-              </a:spcAft>
-              <a:buFont typeface="Arial" panose="020B0604020202020204" pitchFamily="34" charset="0"/>
-              <a:buChar char="•"/>
-            </a:pPr>
-            <a:r>
-              <a:rPr lang="en-US" sz="2400" dirty="0">
-                <a:latin typeface="Segoe UI Semilight" panose="020B0402040204020203" pitchFamily="34" charset="0"/>
-                <a:cs typeface="Segoe UI Semilight" panose="020B0402040204020203" pitchFamily="34" charset="0"/>
-              </a:rPr>
-              <a:t>Implement high availability using Stretch Database and AlwaysOn Availability Groups</a:t>
+              <a:t>At the end of this whiteboard design session, you will be better able to design a database migration plan and implementation.</a:t>
             </a:r>
           </a:p>
         </p:txBody>

</xml_diff>

<commit_message>
Directory cleanup / Update WDS slides.
</commit_message>
<xml_diff>
--- a/Whiteboard design session/WDS trainer presentation - Data platform upgrade and migration.pptx
+++ b/Whiteboard design session/WDS trainer presentation - Data platform upgrade and migration.pptx
@@ -227,7 +227,7 @@
           <a:p>
             <a:fld id="{52A13B17-C506-4D51-BB37-16B365906619}" type="datetimeFigureOut">
               <a:rPr lang="en-US" smtClean="0"/>
-              <a:t>10/24/2018</a:t>
+              <a:t>4/22/2019</a:t>
             </a:fld>
             <a:endParaRPr lang="en-US" dirty="0"/>
           </a:p>
@@ -6232,7 +6232,7 @@
                   <a:prstClr val="black"/>
                 </a:solidFill>
               </a:rPr>
-              <a:t>10/24/2018 3:31 PM</a:t>
+              <a:t>4/22/2019 7:43 PM</a:t>
             </a:fld>
             <a:endParaRPr lang="en-US" dirty="0">
               <a:solidFill>

</xml_diff>